<commit_message>
final work on NVMW talk
</commit_message>
<xml_diff>
--- a/proposal/NVMW.pptx
+++ b/proposal/NVMW.pptx
@@ -7264,15 +7264,7 @@
                   <a:srgbClr val="FF0909"/>
                 </a:solidFill>
               </a:rPr>
-              <a:t>Group </a:t>
-            </a:r>
-            <a:r>
-              <a:rPr lang="en-US" sz="2400" b="0" i="1" dirty="0" smtClean="0">
-                <a:solidFill>
-                  <a:srgbClr val="FF0909"/>
-                </a:solidFill>
-              </a:rPr>
-              <a:t>commit recovers throughput when barrier latency exposed</a:t>
+              <a:t>Group commit recovers throughput when barrier latency exposed</a:t>
             </a:r>
             <a:endParaRPr lang="en-US" sz="2400" b="0" i="1" dirty="0">
               <a:solidFill>
@@ -7527,15 +7519,111 @@
                   <a:srgbClr val="FF0909"/>
                 </a:solidFill>
               </a:rPr>
-              <a:t>Hig</a:t>
-            </a:r>
+              <a:t>High performance barriers and memory system ideal</a:t>
+            </a:r>
+            <a:endParaRPr lang="en-US" sz="2400" b="0" i="1" dirty="0">
+              <a:solidFill>
+                <a:srgbClr val="FF0909"/>
+              </a:solidFill>
+            </a:endParaRPr>
+          </a:p>
+        </p:txBody>
+      </p:sp>
+      <p:sp>
+        <p:nvSpPr>
+          <p:cNvPr id="11" name="Left Arrow 10"/>
+          <p:cNvSpPr/>
+          <p:nvPr/>
+        </p:nvSpPr>
+        <p:spPr bwMode="auto">
+          <a:xfrm>
+            <a:off x="7452320" y="2683958"/>
+            <a:ext cx="980781" cy="413333"/>
+          </a:xfrm>
+          <a:prstGeom prst="leftArrow">
+            <a:avLst/>
+          </a:prstGeom>
+          <a:solidFill>
+            <a:srgbClr val="FF0000"/>
+          </a:solidFill>
+          <a:ln w="9525" cap="flat" cmpd="sng" algn="ctr">
+            <a:solidFill>
+              <a:schemeClr val="tx1"/>
+            </a:solidFill>
+            <a:prstDash val="solid"/>
+            <a:round/>
+            <a:headEnd type="none" w="med" len="med"/>
+            <a:tailEnd type="none" w="med" len="med"/>
+          </a:ln>
+          <a:effectLst/>
+        </p:spPr>
+        <p:txBody>
+          <a:bodyPr vert="horz" wrap="square" lIns="91440" tIns="45720" rIns="91440" bIns="45720" numCol="1" rtlCol="0" anchor="t" anchorCtr="0" compatLnSpc="1">
+            <a:prstTxWarp prst="textNoShape">
+              <a:avLst/>
+            </a:prstTxWarp>
+          </a:bodyPr>
+          <a:lstStyle/>
+          <a:p>
+            <a:pPr marL="0" marR="0" indent="0" algn="l" defTabSz="914400" rtl="0" eaLnBrk="0" fontAlgn="base" latinLnBrk="0" hangingPunct="0">
+              <a:lnSpc>
+                <a:spcPct val="100000"/>
+              </a:lnSpc>
+              <a:spcBef>
+                <a:spcPct val="0"/>
+              </a:spcBef>
+              <a:spcAft>
+                <a:spcPct val="0"/>
+              </a:spcAft>
+              <a:buClrTx/>
+              <a:buSzTx/>
+              <a:buFontTx/>
+              <a:buNone/>
+              <a:tabLst/>
+            </a:pPr>
+            <a:endParaRPr kumimoji="0" lang="en-US" sz="2400" b="0" i="0" u="none" strike="noStrike" cap="none" normalizeH="0" baseline="0" smtClean="0">
+              <a:ln>
+                <a:noFill/>
+              </a:ln>
+              <a:solidFill>
+                <a:schemeClr val="tx1"/>
+              </a:solidFill>
+              <a:effectLst/>
+              <a:latin typeface="Arial" charset="0"/>
+              <a:ea typeface="ＭＳ Ｐゴシック" charset="-128"/>
+            </a:endParaRPr>
+          </a:p>
+        </p:txBody>
+      </p:sp>
+      <p:sp>
+        <p:nvSpPr>
+          <p:cNvPr id="12" name="TextBox 11"/>
+          <p:cNvSpPr txBox="1"/>
+          <p:nvPr/>
+        </p:nvSpPr>
+        <p:spPr>
+          <a:xfrm>
+            <a:off x="1187291" y="6021288"/>
+            <a:ext cx="6769418" cy="461665"/>
+          </a:xfrm>
+          <a:prstGeom prst="rect">
+            <a:avLst/>
+          </a:prstGeom>
+          <a:noFill/>
+        </p:spPr>
+        <p:txBody>
+          <a:bodyPr wrap="none" rtlCol="0">
+            <a:spAutoFit/>
+          </a:bodyPr>
+          <a:lstStyle/>
+          <a:p>
             <a:r>
               <a:rPr lang="en-US" sz="2400" b="0" i="1" dirty="0" smtClean="0">
                 <a:solidFill>
                   <a:srgbClr val="FF0909"/>
                 </a:solidFill>
               </a:rPr>
-              <a:t>h performance barriers and memory system ideal</a:t>
+              <a:t>Disk replacement insensitive to latency, but slow</a:t>
             </a:r>
             <a:endParaRPr lang="en-US" sz="2400" b="0" i="1" dirty="0">
               <a:solidFill>
@@ -7589,7 +7677,7 @@
                                           </p:stCondLst>
                                         </p:cTn>
                                         <p:tgtEl>
-                                          <p:spTgt spid="9"/>
+                                          <p:spTgt spid="12"/>
                                         </p:tgtEl>
                                         <p:attrNameLst>
                                           <p:attrName>style.visibility</p:attrName>
@@ -7616,7 +7704,7 @@
                                           </p:stCondLst>
                                         </p:cTn>
                                         <p:tgtEl>
-                                          <p:spTgt spid="8"/>
+                                          <p:spTgt spid="11"/>
                                         </p:tgtEl>
                                         <p:attrNameLst>
                                           <p:attrName>style.visibility</p:attrName>
@@ -7661,7 +7749,7 @@
                                           </p:stCondLst>
                                         </p:cTn>
                                         <p:tgtEl>
-                                          <p:spTgt spid="9"/>
+                                          <p:spTgt spid="11"/>
                                         </p:tgtEl>
                                         <p:attrNameLst>
                                           <p:attrName>style.visibility</p:attrName>
@@ -7688,7 +7776,7 @@
                                           </p:stCondLst>
                                         </p:cTn>
                                         <p:tgtEl>
-                                          <p:spTgt spid="8"/>
+                                          <p:spTgt spid="12"/>
                                         </p:tgtEl>
                                         <p:attrNameLst>
                                           <p:attrName>style.visibility</p:attrName>
@@ -7733,7 +7821,7 @@
                                           </p:stCondLst>
                                         </p:cTn>
                                         <p:tgtEl>
-                                          <p:spTgt spid="3"/>
+                                          <p:spTgt spid="9"/>
                                         </p:tgtEl>
                                         <p:attrNameLst>
                                           <p:attrName>style.visibility</p:attrName>
@@ -7755,6 +7843,150 @@
                                     <p:set>
                                       <p:cBhvr>
                                         <p:cTn id="20" dur="1" fill="hold">
+                                          <p:stCondLst>
+                                            <p:cond delay="0"/>
+                                          </p:stCondLst>
+                                        </p:cTn>
+                                        <p:tgtEl>
+                                          <p:spTgt spid="8"/>
+                                        </p:tgtEl>
+                                        <p:attrNameLst>
+                                          <p:attrName>style.visibility</p:attrName>
+                                        </p:attrNameLst>
+                                      </p:cBhvr>
+                                      <p:to>
+                                        <p:strVal val="visible"/>
+                                      </p:to>
+                                    </p:set>
+                                  </p:childTnLst>
+                                </p:cTn>
+                              </p:par>
+                            </p:childTnLst>
+                          </p:cTn>
+                        </p:par>
+                      </p:childTnLst>
+                    </p:cTn>
+                  </p:par>
+                  <p:par>
+                    <p:cTn id="21" fill="hold">
+                      <p:stCondLst>
+                        <p:cond delay="indefinite"/>
+                      </p:stCondLst>
+                      <p:childTnLst>
+                        <p:par>
+                          <p:cTn id="22" fill="hold">
+                            <p:stCondLst>
+                              <p:cond delay="0"/>
+                            </p:stCondLst>
+                            <p:childTnLst>
+                              <p:par>
+                                <p:cTn id="23" presetID="1" presetClass="exit" presetSubtype="0" fill="hold" grpId="1" nodeType="clickEffect">
+                                  <p:stCondLst>
+                                    <p:cond delay="0"/>
+                                  </p:stCondLst>
+                                  <p:childTnLst>
+                                    <p:set>
+                                      <p:cBhvr>
+                                        <p:cTn id="24" dur="1" fill="hold">
+                                          <p:stCondLst>
+                                            <p:cond delay="0"/>
+                                          </p:stCondLst>
+                                        </p:cTn>
+                                        <p:tgtEl>
+                                          <p:spTgt spid="9"/>
+                                        </p:tgtEl>
+                                        <p:attrNameLst>
+                                          <p:attrName>style.visibility</p:attrName>
+                                        </p:attrNameLst>
+                                      </p:cBhvr>
+                                      <p:to>
+                                        <p:strVal val="hidden"/>
+                                      </p:to>
+                                    </p:set>
+                                  </p:childTnLst>
+                                </p:cTn>
+                              </p:par>
+                              <p:par>
+                                <p:cTn id="25" presetID="1" presetClass="exit" presetSubtype="0" fill="hold" grpId="1" nodeType="withEffect">
+                                  <p:stCondLst>
+                                    <p:cond delay="0"/>
+                                  </p:stCondLst>
+                                  <p:childTnLst>
+                                    <p:set>
+                                      <p:cBhvr>
+                                        <p:cTn id="26" dur="1" fill="hold">
+                                          <p:stCondLst>
+                                            <p:cond delay="0"/>
+                                          </p:stCondLst>
+                                        </p:cTn>
+                                        <p:tgtEl>
+                                          <p:spTgt spid="8"/>
+                                        </p:tgtEl>
+                                        <p:attrNameLst>
+                                          <p:attrName>style.visibility</p:attrName>
+                                        </p:attrNameLst>
+                                      </p:cBhvr>
+                                      <p:to>
+                                        <p:strVal val="hidden"/>
+                                      </p:to>
+                                    </p:set>
+                                  </p:childTnLst>
+                                </p:cTn>
+                              </p:par>
+                            </p:childTnLst>
+                          </p:cTn>
+                        </p:par>
+                      </p:childTnLst>
+                    </p:cTn>
+                  </p:par>
+                  <p:par>
+                    <p:cTn id="27" fill="hold">
+                      <p:stCondLst>
+                        <p:cond delay="indefinite"/>
+                      </p:stCondLst>
+                      <p:childTnLst>
+                        <p:par>
+                          <p:cTn id="28" fill="hold">
+                            <p:stCondLst>
+                              <p:cond delay="0"/>
+                            </p:stCondLst>
+                            <p:childTnLst>
+                              <p:par>
+                                <p:cTn id="29" presetID="1" presetClass="entr" presetSubtype="0" fill="hold" grpId="0" nodeType="clickEffect">
+                                  <p:stCondLst>
+                                    <p:cond delay="0"/>
+                                  </p:stCondLst>
+                                  <p:childTnLst>
+                                    <p:set>
+                                      <p:cBhvr>
+                                        <p:cTn id="30" dur="1" fill="hold">
+                                          <p:stCondLst>
+                                            <p:cond delay="0"/>
+                                          </p:stCondLst>
+                                        </p:cTn>
+                                        <p:tgtEl>
+                                          <p:spTgt spid="3"/>
+                                        </p:tgtEl>
+                                        <p:attrNameLst>
+                                          <p:attrName>style.visibility</p:attrName>
+                                        </p:attrNameLst>
+                                      </p:cBhvr>
+                                      <p:to>
+                                        <p:strVal val="visible"/>
+                                      </p:to>
+                                    </p:set>
+                                  </p:childTnLst>
+                                </p:cTn>
+                              </p:par>
+                              <p:par>
+                                <p:cTn id="31" presetID="1" presetClass="entr" presetSubtype="0" fill="hold" grpId="0" nodeType="withEffect">
+                                  <p:stCondLst>
+                                    <p:cond delay="0"/>
+                                  </p:stCondLst>
+                                  <p:childTnLst>
+                                    <p:set>
+                                      <p:cBhvr>
+                                        <p:cTn id="32" dur="1" fill="hold">
                                           <p:stCondLst>
                                             <p:cond delay="0"/>
                                           </p:stCondLst>
@@ -7807,6 +8039,10 @@
       <p:bldP spid="9" grpId="0" animBg="1"/>
       <p:bldP spid="9" grpId="1" animBg="1"/>
       <p:bldP spid="10" grpId="0"/>
+      <p:bldP spid="11" grpId="0" animBg="1"/>
+      <p:bldP spid="11" grpId="1" animBg="1"/>
+      <p:bldP spid="12" grpId="0"/>
+      <p:bldP spid="12" grpId="1"/>
     </p:bldLst>
   </p:timing>
 </p:sld>
@@ -7846,7 +8082,7 @@
           <a:p>
             <a:r>
               <a:rPr lang="en-US" dirty="0" smtClean="0"/>
-              <a:t>Not discussed (see VLDB paper)</a:t>
+              <a:t>In the VLDB paper…</a:t>
             </a:r>
             <a:endParaRPr lang="en-US" dirty="0"/>
           </a:p>
@@ -7971,15 +8207,15 @@
           <a:p>
             <a:r>
               <a:rPr lang="en-US" dirty="0" smtClean="0"/>
-              <a:t>Next: p</a:t>
-            </a:r>
-            <a:r>
-              <a:rPr lang="en-US" dirty="0" smtClean="0"/>
-              <a:t>ractical</a:t>
-            </a:r>
-            <a:r>
-              <a:rPr lang="en-US" dirty="0" smtClean="0"/>
-              <a:t> NVRAM optimizations</a:t>
+              <a:t>Future work</a:t>
+            </a:r>
+            <a:r>
+              <a:rPr lang="en-US" smtClean="0"/>
+              <a:t>: NVRAM </a:t>
+            </a:r>
+            <a:r>
+              <a:rPr lang="en-US" dirty="0" smtClean="0"/>
+              <a:t>optimizations</a:t>
             </a:r>
             <a:endParaRPr lang="en-US" dirty="0"/>
           </a:p>
@@ -8018,7 +8254,6 @@
               <a:rPr lang="en-US" dirty="0" smtClean="0"/>
               <a:t>Hides persist and persist barrier latency</a:t>
             </a:r>
-            <a:endParaRPr lang="en-US" dirty="0" smtClean="0"/>
           </a:p>
           <a:p>
             <a:pPr lvl="1"/>
@@ -8042,13 +8277,8 @@
             <a:pPr lvl="1"/>
             <a:r>
               <a:rPr lang="en-US" dirty="0" smtClean="0"/>
-              <a:t>Omit persists </a:t>
-            </a:r>
-            <a:r>
-              <a:rPr lang="en-US" dirty="0" smtClean="0"/>
-              <a:t>if ordering constraints not violated</a:t>
-            </a:r>
-            <a:endParaRPr lang="en-US" dirty="0" smtClean="0"/>
+              <a:t>Omit persists if ordering constraints not violated</a:t>
+            </a:r>
           </a:p>
           <a:p>
             <a:pPr lvl="1"/>
@@ -8061,11 +8291,7 @@
             <a:pPr lvl="1"/>
             <a:r>
               <a:rPr lang="en-US" dirty="0" smtClean="0"/>
-              <a:t>Reduces </a:t>
-            </a:r>
-            <a:r>
-              <a:rPr lang="en-US" dirty="0" smtClean="0"/>
-              <a:t>persist ordering critical path</a:t>
+              <a:t>Reduces persist ordering critical path</a:t>
             </a:r>
           </a:p>
         </p:txBody>
@@ -8122,15 +8348,25 @@
                   <a:srgbClr val="FF0909"/>
                 </a:solidFill>
               </a:rPr>
-              <a:t>Need </a:t>
-            </a:r>
+              <a:t>Need mechanisms to precisely label persist ordering constraints</a:t>
+            </a:r>
+          </a:p>
+          <a:p>
             <a:r>
               <a:rPr lang="en-US" sz="2400" b="0" i="1" dirty="0" smtClean="0">
                 <a:solidFill>
                   <a:srgbClr val="FF0909"/>
                 </a:solidFill>
               </a:rPr>
-              <a:t>mechanisms</a:t>
+              <a:t>[upcoming ISCA: </a:t>
+            </a:r>
+            <a:r>
+              <a:rPr lang="en-US" sz="2400" i="1" dirty="0" smtClean="0">
+                <a:solidFill>
+                  <a:srgbClr val="FF0909"/>
+                </a:solidFill>
+              </a:rPr>
+              <a:t>Memory Persistency</a:t>
             </a:r>
             <a:r>
               <a:rPr lang="en-US" sz="2400" b="0" i="1" dirty="0" smtClean="0">
@@ -8138,41 +8374,7 @@
                   <a:srgbClr val="FF0909"/>
                 </a:solidFill>
               </a:rPr>
-              <a:t> </a:t>
-            </a:r>
-            <a:r>
-              <a:rPr lang="en-US" sz="2400" b="0" i="1" dirty="0" smtClean="0">
-                <a:solidFill>
-                  <a:srgbClr val="FF0909"/>
-                </a:solidFill>
-              </a:rPr>
-              <a:t>to precisely label persist ordering </a:t>
-            </a:r>
-            <a:r>
-              <a:rPr lang="en-US" sz="2400" b="0" i="1" dirty="0" smtClean="0">
-                <a:solidFill>
-                  <a:srgbClr val="FF0909"/>
-                </a:solidFill>
-              </a:rPr>
-              <a:t>constraints</a:t>
-            </a:r>
-          </a:p>
-          <a:p>
-            <a:r>
-              <a:rPr lang="en-US" sz="2400" b="0" i="1" dirty="0" smtClean="0">
-                <a:solidFill>
-                  <a:srgbClr val="FF0909"/>
-                </a:solidFill>
-              </a:rPr>
-              <a:t>[upcoming ISCA]</a:t>
-            </a:r>
-            <a:r>
-              <a:rPr lang="en-US" sz="2400" b="0" i="1" dirty="0" smtClean="0">
-                <a:solidFill>
-                  <a:srgbClr val="FF0909"/>
-                </a:solidFill>
-              </a:rPr>
-              <a:t> </a:t>
+              <a:t>] </a:t>
             </a:r>
             <a:endParaRPr lang="en-US" sz="2400" b="0" i="1" dirty="0">
               <a:solidFill>
@@ -8932,11 +9134,7 @@
             <a:pPr algn="l"/>
             <a:r>
               <a:rPr lang="en-US" b="0" dirty="0" smtClean="0"/>
-              <a:t>~ </a:t>
-            </a:r>
-            <a:r>
-              <a:rPr lang="en-US" b="0" dirty="0" smtClean="0"/>
-              <a:t>30 15krpm disks</a:t>
+              <a:t>~ 30 15krpm disks</a:t>
             </a:r>
           </a:p>
           <a:p>
@@ -8950,13 +9148,8 @@
             <a:pPr algn="l"/>
             <a:r>
               <a:rPr lang="en-US" sz="1200" b="0" dirty="0" smtClean="0"/>
-              <a:t>[device IOPS rates: Symantec</a:t>
-            </a:r>
-            <a:r>
-              <a:rPr lang="en-US" sz="1200" b="0" dirty="0" smtClean="0"/>
-              <a:t>]</a:t>
-            </a:r>
-            <a:endParaRPr lang="en-US" sz="1200" b="0" dirty="0" smtClean="0"/>
+              <a:t>[device IOPS rates: Symantec]</a:t>
+            </a:r>
           </a:p>
         </p:txBody>
       </p:sp>
@@ -9419,17 +9612,6 @@
               </a:rPr>
               <a:t>+50%</a:t>
             </a:r>
-            <a:endParaRPr kumimoji="0" lang="en-US" sz="2400" b="0" i="0" u="none" strike="noStrike" cap="none" normalizeH="0" baseline="0" dirty="0" smtClean="0">
-              <a:ln>
-                <a:noFill/>
-              </a:ln>
-              <a:solidFill>
-                <a:schemeClr val="tx1"/>
-              </a:solidFill>
-              <a:effectLst/>
-              <a:latin typeface="Arial" charset="0"/>
-              <a:ea typeface="ＭＳ Ｐゴシック" charset="-128"/>
-            </a:endParaRPr>
           </a:p>
         </p:txBody>
       </p:sp>
@@ -11238,7 +11420,15 @@
             </a:r>
             <a:r>
               <a:rPr lang="en-US" dirty="0"/>
-              <a:t>data through </a:t>
+              <a:t>data </a:t>
+            </a:r>
+            <a:r>
+              <a:rPr lang="en-US" dirty="0" smtClean="0"/>
+              <a:t>against</a:t>
+            </a:r>
+            <a:r>
+              <a:rPr lang="en-US" dirty="0" smtClean="0"/>
+              <a:t> </a:t>
             </a:r>
             <a:r>
               <a:rPr lang="en-US" dirty="0" smtClean="0"/>
@@ -11262,25 +11452,8 @@
           <a:p>
             <a:r>
               <a:rPr lang="en-US" dirty="0" smtClean="0"/>
-              <a:t>NVRAM </a:t>
-            </a:r>
-            <a:r>
-              <a:rPr lang="en-US" dirty="0" smtClean="0"/>
-              <a:t>accelerates</a:t>
-            </a:r>
-            <a:r>
-              <a:rPr lang="en-US" dirty="0" smtClean="0"/>
-              <a:t> </a:t>
-            </a:r>
-            <a:r>
-              <a:rPr lang="en-US" dirty="0" smtClean="0"/>
-              <a:t>persistent </a:t>
-            </a:r>
-            <a:r>
-              <a:rPr lang="en-US" dirty="0" smtClean="0"/>
-              <a:t>storage access</a:t>
-            </a:r>
-            <a:endParaRPr lang="en-US" dirty="0" smtClean="0"/>
+              <a:t>NVRAM accelerates persistent storage access</a:t>
+            </a:r>
           </a:p>
           <a:p>
             <a:pPr lvl="1"/>
@@ -11292,21 +11465,8 @@
           <a:p>
             <a:r>
               <a:rPr lang="en-US" dirty="0" smtClean="0"/>
-              <a:t>Create recoverable, h</a:t>
-            </a:r>
-            <a:r>
-              <a:rPr lang="en-US" dirty="0" smtClean="0"/>
-              <a:t>igh </a:t>
-            </a:r>
-            <a:r>
-              <a:rPr lang="en-US" dirty="0" smtClean="0"/>
-              <a:t>performance data structures (main-memory/DRAM speed</a:t>
-            </a:r>
-            <a:r>
-              <a:rPr lang="en-US" dirty="0" smtClean="0"/>
-              <a:t>)</a:t>
-            </a:r>
-            <a:endParaRPr lang="en-US" dirty="0" smtClean="0"/>
+              <a:t>Create recoverable, high performance data structures (main-memory/DRAM speed)</a:t>
+            </a:r>
           </a:p>
         </p:txBody>
       </p:sp>
@@ -11497,7 +11657,7 @@
           <a:p>
             <a:r>
               <a:rPr lang="en-US" dirty="0" smtClean="0"/>
-              <a:t>Optimizing NVRAM services</a:t>
+              <a:t>Optimizing NVRAM </a:t>
             </a:r>
             <a:endParaRPr lang="en-US" dirty="0"/>
           </a:p>
@@ -11527,13 +11687,8 @@
             <a:pPr lvl="1"/>
             <a:r>
               <a:rPr lang="en-US" dirty="0" smtClean="0"/>
-              <a:t>NVRAM as a disk replacement (</a:t>
-            </a:r>
-            <a:r>
-              <a:rPr lang="en-US" dirty="0" smtClean="0"/>
-              <a:t>ARIES/WAL)</a:t>
-            </a:r>
-            <a:endParaRPr lang="en-US" dirty="0" smtClean="0"/>
+              <a:t>NVRAM as a disk replacement (ARIES/WAL)</a:t>
+            </a:r>
           </a:p>
           <a:p>
             <a:pPr lvl="1"/>
@@ -11556,15 +11711,15 @@
           <a:p>
             <a:r>
               <a:rPr lang="en-US" dirty="0" smtClean="0"/>
-              <a:t>Next: e</a:t>
-            </a:r>
-            <a:r>
-              <a:rPr lang="en-US" dirty="0" smtClean="0"/>
-              <a:t>xplore </a:t>
-            </a:r>
-            <a:r>
-              <a:rPr lang="en-US" dirty="0" smtClean="0"/>
-              <a:t>desirable optimizations and semantics for NVRAM memory systems</a:t>
+              <a:t>Future work</a:t>
+            </a:r>
+            <a:r>
+              <a:rPr lang="en-US" dirty="0" smtClean="0"/>
+              <a:t>: </a:t>
+            </a:r>
+            <a:r>
+              <a:rPr lang="en-US" dirty="0" smtClean="0"/>
+              <a:t>explore desirable optimizations and semantics for NVRAM memory systems</a:t>
             </a:r>
           </a:p>
         </p:txBody>
@@ -12505,15 +12660,7 @@
           <a:p>
             <a:r>
               <a:rPr lang="en-US" dirty="0" smtClean="0"/>
-              <a:t>Alternative: order </a:t>
-            </a:r>
-            <a:r>
-              <a:rPr lang="en-US" dirty="0" smtClean="0"/>
-              <a:t>persists </a:t>
-            </a:r>
-            <a:r>
-              <a:rPr lang="en-US" dirty="0" smtClean="0"/>
-              <a:t>immediately</a:t>
+              <a:t>Alternative: order persists immediately</a:t>
             </a:r>
             <a:endParaRPr lang="en-US" dirty="0"/>
           </a:p>
@@ -12536,11 +12683,11 @@
           <a:p>
             <a:r>
               <a:rPr lang="en-US" dirty="0" smtClean="0"/>
-              <a:t>Persist b</a:t>
-            </a:r>
-            <a:r>
-              <a:rPr lang="en-US" dirty="0" smtClean="0"/>
-              <a:t>arriers previously proposed </a:t>
+              <a:t>Persist </a:t>
+            </a:r>
+            <a:r>
+              <a:rPr lang="en-US" dirty="0" smtClean="0"/>
+              <a:t>barriers </a:t>
             </a:r>
             <a:r>
               <a:rPr lang="en-US" sz="1800" dirty="0" smtClean="0"/>
@@ -12592,15 +12739,7 @@
             </a:r>
             <a:r>
               <a:rPr lang="en-US" dirty="0" smtClean="0"/>
-              <a:t> </a:t>
-            </a:r>
-            <a:r>
-              <a:rPr lang="en-US" dirty="0" smtClean="0"/>
-              <a:t>determine </a:t>
-            </a:r>
-            <a:r>
-              <a:rPr lang="en-US" dirty="0" smtClean="0"/>
-              <a:t>resulting performance</a:t>
+              <a:t> determine resulting performance</a:t>
             </a:r>
           </a:p>
         </p:txBody>
@@ -12683,11 +12822,7 @@
           <a:p>
             <a:r>
               <a:rPr lang="en-US" dirty="0" smtClean="0"/>
-              <a:t>NVRAM in-place </a:t>
-            </a:r>
-            <a:r>
-              <a:rPr lang="en-US" dirty="0" smtClean="0"/>
-              <a:t>updates</a:t>
+              <a:t>NVRAM in-place updates</a:t>
             </a:r>
             <a:endParaRPr lang="en-US" dirty="0"/>
           </a:p>
@@ -13902,18 +14037,10 @@
               <a:tabLst/>
             </a:pPr>
             <a:r>
-              <a:rPr kumimoji="0" lang="en-US" sz="2400" b="0" i="0" u="none" strike="noStrike" cap="none" normalizeH="0" baseline="0" dirty="0" smtClean="0">
-                <a:ln>
-                  <a:noFill/>
-                </a:ln>
-                <a:solidFill>
-                  <a:schemeClr val="tx1"/>
-                </a:solidFill>
-                <a:effectLst/>
-                <a:latin typeface="Arial" charset="0"/>
+              <a:rPr lang="en-US" sz="2400" b="0" dirty="0" smtClean="0">
                 <a:ea typeface="ＭＳ Ｐゴシック" charset="-128"/>
               </a:rPr>
-              <a:t>Undo</a:t>
+              <a:t>Persist</a:t>
             </a:r>
             <a:r>
               <a:rPr kumimoji="0" lang="en-US" sz="2400" b="0" i="0" u="none" strike="noStrike" cap="none" normalizeH="0" dirty="0" smtClean="0">
@@ -13927,7 +14054,21 @@
                 <a:latin typeface="Arial" charset="0"/>
                 <a:ea typeface="ＭＳ Ｐゴシック" charset="-128"/>
               </a:rPr>
-              <a:t> log</a:t>
+              <a:t> </a:t>
+            </a:r>
+            <a:r>
+              <a:rPr kumimoji="0" lang="en-US" sz="2400" b="0" i="0" u="none" strike="noStrike" cap="none" normalizeH="0" dirty="0" smtClean="0">
+                <a:ln>
+                  <a:noFill/>
+                </a:ln>
+                <a:solidFill>
+                  <a:schemeClr val="tx1"/>
+                </a:solidFill>
+                <a:effectLst/>
+                <a:latin typeface="Arial" charset="0"/>
+                <a:ea typeface="ＭＳ Ｐゴシック" charset="-128"/>
+              </a:rPr>
+              <a:t>log</a:t>
             </a:r>
             <a:endParaRPr kumimoji="0" lang="en-US" sz="2400" b="0" i="0" u="none" strike="noStrike" cap="none" normalizeH="0" baseline="0" dirty="0" smtClean="0">
               <a:ln>
@@ -13999,7 +14140,13 @@
               <a:rPr lang="en-US" sz="2400" b="0" dirty="0" smtClean="0">
                 <a:ea typeface="ＭＳ Ｐゴシック" charset="-128"/>
               </a:rPr>
-              <a:t>Persist store</a:t>
+              <a:t>Persist </a:t>
+            </a:r>
+            <a:r>
+              <a:rPr lang="en-US" sz="2400" b="0" dirty="0" smtClean="0">
+                <a:ea typeface="ＭＳ Ｐゴシック" charset="-128"/>
+              </a:rPr>
+              <a:t>heap</a:t>
             </a:r>
             <a:endParaRPr kumimoji="0" lang="en-US" sz="2400" b="0" i="0" u="none" strike="noStrike" cap="none" normalizeH="0" baseline="0" dirty="0" smtClean="0">
               <a:ln>
@@ -14283,15 +14430,7 @@
             <a:pPr algn="l"/>
             <a:r>
               <a:rPr lang="en-US" b="0" dirty="0" smtClean="0"/>
-              <a:t>Batch’s updates</a:t>
-            </a:r>
-            <a:r>
-              <a:rPr lang="en-US" b="0" dirty="0" smtClean="0"/>
-              <a:t> persist to batch log, then </a:t>
-            </a:r>
-            <a:r>
-              <a:rPr lang="en-US" b="0" dirty="0" smtClean="0"/>
-              <a:t>in place</a:t>
+              <a:t>Batch’s updates persist to batch log, then in place</a:t>
             </a:r>
             <a:endParaRPr lang="en-US" b="0" dirty="0"/>
           </a:p>

</xml_diff>

<commit_message>
last minute changes to NVMW slides
</commit_message>
<xml_diff>
--- a/proposal/NVMW.pptx
+++ b/proposal/NVMW.pptx
@@ -8509,7 +8509,7 @@
           <a:p>
             <a:r>
               <a:rPr lang="en-US" dirty="0" smtClean="0"/>
-              <a:t>Conclusions</a:t>
+              <a:t>Conclusion</a:t>
             </a:r>
             <a:endParaRPr lang="en-US" dirty="0"/>
           </a:p>
@@ -10839,7 +10839,27 @@
           <a:p>
             <a:r>
               <a:rPr lang="en-US" dirty="0" smtClean="0"/>
-              <a:t>New NVRAMs provide fast, scalable storage (phase change, </a:t>
+              <a:t>New NVRAMs provide </a:t>
+            </a:r>
+            <a:r>
+              <a:rPr lang="en-US" dirty="0" smtClean="0"/>
+              <a:t>fast</a:t>
+            </a:r>
+            <a:r>
+              <a:rPr lang="en-US" dirty="0"/>
+              <a:t> </a:t>
+            </a:r>
+            <a:r>
+              <a:rPr lang="en-US" dirty="0" smtClean="0"/>
+              <a:t>durable</a:t>
+            </a:r>
+            <a:r>
+              <a:rPr lang="en-US" dirty="0" smtClean="0"/>
+              <a:t> </a:t>
+            </a:r>
+            <a:r>
+              <a:rPr lang="en-US" dirty="0" smtClean="0"/>
+              <a:t>storage (phase change, </a:t>
             </a:r>
             <a:r>
               <a:rPr lang="en-US" dirty="0" err="1" smtClean="0"/>
@@ -11424,16 +11444,13 @@
             </a:r>
             <a:r>
               <a:rPr lang="en-US" dirty="0" smtClean="0"/>
-              <a:t>against</a:t>
-            </a:r>
-            <a:r>
-              <a:rPr lang="en-US" dirty="0" smtClean="0"/>
-              <a:t> </a:t>
-            </a:r>
-            <a:r>
-              <a:rPr lang="en-US" dirty="0" smtClean="0"/>
-              <a:t>failure</a:t>
-            </a:r>
+              <a:t>against </a:t>
+            </a:r>
+            <a:r>
+              <a:rPr lang="en-US" dirty="0" smtClean="0"/>
+              <a:t>server failure</a:t>
+            </a:r>
+            <a:endParaRPr lang="en-US" dirty="0" smtClean="0"/>
           </a:p>
           <a:p>
             <a:pPr lvl="1"/>
@@ -11711,15 +11728,7 @@
           <a:p>
             <a:r>
               <a:rPr lang="en-US" dirty="0" smtClean="0"/>
-              <a:t>Future work</a:t>
-            </a:r>
-            <a:r>
-              <a:rPr lang="en-US" dirty="0" smtClean="0"/>
-              <a:t>: </a:t>
-            </a:r>
-            <a:r>
-              <a:rPr lang="en-US" dirty="0" smtClean="0"/>
-              <a:t>explore desirable optimizations and semantics for NVRAM memory systems</a:t>
+              <a:t>Future work: explore desirable optimizations and semantics for NVRAM memory systems</a:t>
             </a:r>
           </a:p>
         </p:txBody>
@@ -12683,11 +12692,7 @@
           <a:p>
             <a:r>
               <a:rPr lang="en-US" dirty="0" smtClean="0"/>
-              <a:t>Persist </a:t>
-            </a:r>
-            <a:r>
-              <a:rPr lang="en-US" dirty="0" smtClean="0"/>
-              <a:t>barriers </a:t>
+              <a:t>Persist barriers </a:t>
             </a:r>
             <a:r>
               <a:rPr lang="en-US" sz="1800" dirty="0" smtClean="0"/>
@@ -14054,21 +14059,7 @@
                 <a:latin typeface="Arial" charset="0"/>
                 <a:ea typeface="ＭＳ Ｐゴシック" charset="-128"/>
               </a:rPr>
-              <a:t> </a:t>
-            </a:r>
-            <a:r>
-              <a:rPr kumimoji="0" lang="en-US" sz="2400" b="0" i="0" u="none" strike="noStrike" cap="none" normalizeH="0" dirty="0" smtClean="0">
-                <a:ln>
-                  <a:noFill/>
-                </a:ln>
-                <a:solidFill>
-                  <a:schemeClr val="tx1"/>
-                </a:solidFill>
-                <a:effectLst/>
-                <a:latin typeface="Arial" charset="0"/>
-                <a:ea typeface="ＭＳ Ｐゴシック" charset="-128"/>
-              </a:rPr>
-              <a:t>log</a:t>
+              <a:t> log</a:t>
             </a:r>
             <a:endParaRPr kumimoji="0" lang="en-US" sz="2400" b="0" i="0" u="none" strike="noStrike" cap="none" normalizeH="0" baseline="0" dirty="0" smtClean="0">
               <a:ln>
@@ -14140,13 +14131,7 @@
               <a:rPr lang="en-US" sz="2400" b="0" dirty="0" smtClean="0">
                 <a:ea typeface="ＭＳ Ｐゴシック" charset="-128"/>
               </a:rPr>
-              <a:t>Persist </a:t>
-            </a:r>
-            <a:r>
-              <a:rPr lang="en-US" sz="2400" b="0" dirty="0" smtClean="0">
-                <a:ea typeface="ＭＳ Ｐゴシック" charset="-128"/>
-              </a:rPr>
-              <a:t>heap</a:t>
+              <a:t>Persist heap</a:t>
             </a:r>
             <a:endParaRPr kumimoji="0" lang="en-US" sz="2400" b="0" i="0" u="none" strike="noStrike" cap="none" normalizeH="0" baseline="0" dirty="0" smtClean="0">
               <a:ln>
@@ -14883,18 +14868,10 @@
               <a:tabLst/>
             </a:pPr>
             <a:r>
-              <a:rPr kumimoji="0" lang="en-US" sz="2400" b="0" i="0" u="none" strike="noStrike" cap="none" normalizeH="0" baseline="0" dirty="0" smtClean="0">
-                <a:ln>
-                  <a:noFill/>
-                </a:ln>
-                <a:solidFill>
-                  <a:schemeClr val="tx1"/>
-                </a:solidFill>
-                <a:effectLst/>
-                <a:latin typeface="Arial" charset="0"/>
+              <a:rPr lang="en-US" sz="2400" b="0" dirty="0" smtClean="0">
                 <a:ea typeface="ＭＳ Ｐゴシック" charset="-128"/>
               </a:rPr>
-              <a:t>Undo</a:t>
+              <a:t>Persist</a:t>
             </a:r>
             <a:r>
               <a:rPr kumimoji="0" lang="en-US" sz="2400" b="0" i="0" u="none" strike="noStrike" cap="none" normalizeH="0" dirty="0" smtClean="0">
@@ -14908,7 +14885,21 @@
                 <a:latin typeface="Arial" charset="0"/>
                 <a:ea typeface="ＭＳ Ｐゴシック" charset="-128"/>
               </a:rPr>
-              <a:t> log</a:t>
+              <a:t> </a:t>
+            </a:r>
+            <a:r>
+              <a:rPr kumimoji="0" lang="en-US" sz="2400" b="0" i="0" u="none" strike="noStrike" cap="none" normalizeH="0" dirty="0" smtClean="0">
+                <a:ln>
+                  <a:noFill/>
+                </a:ln>
+                <a:solidFill>
+                  <a:schemeClr val="tx1"/>
+                </a:solidFill>
+                <a:effectLst/>
+                <a:latin typeface="Arial" charset="0"/>
+                <a:ea typeface="ＭＳ Ｐゴシック" charset="-128"/>
+              </a:rPr>
+              <a:t>log</a:t>
             </a:r>
             <a:endParaRPr kumimoji="0" lang="en-US" sz="2400" b="0" i="0" u="none" strike="noStrike" cap="none" normalizeH="0" baseline="0" dirty="0" smtClean="0">
               <a:ln>
@@ -14980,7 +14971,13 @@
               <a:rPr lang="en-US" sz="2400" b="0" dirty="0" smtClean="0">
                 <a:ea typeface="ＭＳ Ｐゴシック" charset="-128"/>
               </a:rPr>
-              <a:t>Persist store</a:t>
+              <a:t>Persist </a:t>
+            </a:r>
+            <a:r>
+              <a:rPr lang="en-US" sz="2400" b="0" dirty="0" smtClean="0">
+                <a:ea typeface="ＭＳ Ｐゴシック" charset="-128"/>
+              </a:rPr>
+              <a:t>heap</a:t>
             </a:r>
             <a:endParaRPr kumimoji="0" lang="en-US" sz="2400" b="0" i="0" u="none" strike="noStrike" cap="none" normalizeH="0" baseline="0" dirty="0" smtClean="0">
               <a:ln>

</xml_diff>